<commit_message>
Finalized with Final PPT
</commit_message>
<xml_diff>
--- a/Goodreads_Presentation.pptx
+++ b/Goodreads_Presentation.pptx
@@ -19,6 +19,7 @@
     <p:sldId id="264" r:id="rId13"/>
     <p:sldId id="266" r:id="rId14"/>
     <p:sldId id="270" r:id="rId15"/>
+    <p:sldId id="271" r:id="rId16"/>
   </p:sldIdLst>
   <p:sldSz cx="12192000" cy="6858000"/>
   <p:notesSz cx="6858000" cy="9144000"/>
@@ -4099,15 +4100,7 @@
           <a:p>
             <a:r>
               <a:rPr lang="en-US" sz="2800" dirty="0"/>
-              <a:t>Conduct further </a:t>
-            </a:r>
-            <a:r>
-              <a:rPr lang="en-US" sz="2800"/>
-              <a:t>study on </a:t>
-            </a:r>
-            <a:r>
-              <a:rPr lang="en-US" sz="2800" dirty="0"/>
-              <a:t>the practices of Little, Brown and Company to understand why they have had so much success</a:t>
+              <a:t>Conduct further study on the practices of Little, Brown and Company to understand why they have had so much success</a:t>
             </a:r>
           </a:p>
           <a:p>
@@ -4122,6 +4115,100 @@
     <p:extLst>
       <p:ext uri="{BB962C8B-B14F-4D97-AF65-F5344CB8AC3E}">
         <p14:creationId xmlns:p14="http://schemas.microsoft.com/office/powerpoint/2010/main" val="2237504693"/>
+      </p:ext>
+    </p:extLst>
+  </p:cSld>
+  <p:clrMapOvr>
+    <a:masterClrMapping/>
+  </p:clrMapOvr>
+</p:sld>
+</file>
+
+<file path=ppt/slides/slide15.xml><?xml version="1.0" encoding="utf-8"?>
+<p:sld xmlns:a="http://schemas.openxmlformats.org/drawingml/2006/main" xmlns:r="http://schemas.openxmlformats.org/officeDocument/2006/relationships" xmlns:p="http://schemas.openxmlformats.org/presentationml/2006/main">
+  <p:cSld>
+    <p:spTree>
+      <p:nvGrpSpPr>
+        <p:cNvPr id="1" name=""/>
+        <p:cNvGrpSpPr/>
+        <p:nvPr/>
+      </p:nvGrpSpPr>
+      <p:grpSpPr>
+        <a:xfrm>
+          <a:off x="0" y="0"/>
+          <a:ext cx="0" cy="0"/>
+          <a:chOff x="0" y="0"/>
+          <a:chExt cx="0" cy="0"/>
+        </a:xfrm>
+      </p:grpSpPr>
+      <p:sp>
+        <p:nvSpPr>
+          <p:cNvPr id="2" name="Title 1">
+            <a:extLst>
+              <a:ext uri="{FF2B5EF4-FFF2-40B4-BE49-F238E27FC236}">
+                <a16:creationId xmlns:a16="http://schemas.microsoft.com/office/drawing/2014/main" id="{4BEAFA72-DDAE-4C48-885B-361C46E42DF9}"/>
+              </a:ext>
+            </a:extLst>
+          </p:cNvPr>
+          <p:cNvSpPr>
+            <a:spLocks noGrp="1"/>
+          </p:cNvSpPr>
+          <p:nvPr>
+            <p:ph type="title"/>
+          </p:nvPr>
+        </p:nvSpPr>
+        <p:spPr/>
+        <p:txBody>
+          <a:bodyPr/>
+          <a:lstStyle/>
+          <a:p>
+            <a:r>
+              <a:rPr lang="en-US" dirty="0"/>
+              <a:t>Moving forward</a:t>
+            </a:r>
+          </a:p>
+        </p:txBody>
+      </p:sp>
+      <p:sp>
+        <p:nvSpPr>
+          <p:cNvPr id="3" name="Content Placeholder 2">
+            <a:extLst>
+              <a:ext uri="{FF2B5EF4-FFF2-40B4-BE49-F238E27FC236}">
+                <a16:creationId xmlns:a16="http://schemas.microsoft.com/office/drawing/2014/main" id="{9076167E-08E6-1244-A833-CFF103BADEC2}"/>
+              </a:ext>
+            </a:extLst>
+          </p:cNvPr>
+          <p:cNvSpPr>
+            <a:spLocks noGrp="1"/>
+          </p:cNvSpPr>
+          <p:nvPr>
+            <p:ph idx="1"/>
+          </p:nvPr>
+        </p:nvSpPr>
+        <p:spPr/>
+        <p:txBody>
+          <a:bodyPr>
+            <a:normAutofit/>
+          </a:bodyPr>
+          <a:lstStyle/>
+          <a:p>
+            <a:r>
+              <a:rPr lang="en-US" sz="2800" dirty="0"/>
+              <a:t>Time series analysis on YA and Fantasy</a:t>
+            </a:r>
+          </a:p>
+          <a:p>
+            <a:r>
+              <a:rPr lang="en-US" sz="2800" dirty="0"/>
+              <a:t>Analysis of individual books to determine what impacts ratings on a “local” level</a:t>
+            </a:r>
+          </a:p>
+        </p:txBody>
+      </p:sp>
+    </p:spTree>
+    <p:extLst>
+      <p:ext uri="{BB962C8B-B14F-4D97-AF65-F5344CB8AC3E}">
+        <p14:creationId xmlns:p14="http://schemas.microsoft.com/office/powerpoint/2010/main" val="1982380044"/>
       </p:ext>
     </p:extLst>
   </p:cSld>
@@ -4194,23 +4281,25 @@
         </p:nvSpPr>
         <p:spPr/>
         <p:txBody>
-          <a:bodyPr/>
-          <a:lstStyle/>
-          <a:p>
-            <a:r>
-              <a:rPr lang="en-US" dirty="0"/>
+          <a:bodyPr>
+            <a:normAutofit/>
+          </a:bodyPr>
+          <a:lstStyle/>
+          <a:p>
+            <a:r>
+              <a:rPr lang="en-US" sz="2800" dirty="0"/>
               <a:t>You’re a new publisher on the scene, looking to make your mark</a:t>
             </a:r>
           </a:p>
           <a:p>
             <a:r>
-              <a:rPr lang="en-US" dirty="0"/>
+              <a:rPr lang="en-US" sz="2800" dirty="0"/>
               <a:t>Goodreads tracks 200 most popular books every year</a:t>
             </a:r>
           </a:p>
           <a:p>
             <a:r>
-              <a:rPr lang="en-US" dirty="0"/>
+              <a:rPr lang="en-US" sz="2800" dirty="0"/>
               <a:t>Objective: find insights into trends so you can publish books that have a chance to make it onto the list of most popular books for a given year</a:t>
             </a:r>
           </a:p>
@@ -4269,7 +4358,7 @@
           <a:p>
             <a:r>
               <a:rPr lang="en-US" dirty="0"/>
-              <a:t>Assumptions</a:t>
+              <a:t>Assumptions/Potential data errors</a:t>
             </a:r>
           </a:p>
         </p:txBody>
@@ -4404,7 +4493,7 @@
           <a:p>
             <a:r>
               <a:rPr lang="en-US" dirty="0"/>
-              <a:t>Assumptions</a:t>
+              <a:t>Assumptions/potential data errors</a:t>
             </a:r>
           </a:p>
         </p:txBody>
@@ -4432,17 +4521,19 @@
           </a:xfrm>
         </p:spPr>
         <p:txBody>
-          <a:bodyPr/>
-          <a:lstStyle/>
-          <a:p>
-            <a:r>
-              <a:rPr lang="en-US" dirty="0"/>
+          <a:bodyPr>
+            <a:normAutofit/>
+          </a:bodyPr>
+          <a:lstStyle/>
+          <a:p>
+            <a:r>
+              <a:rPr lang="en-US" sz="2800" dirty="0"/>
               <a:t>List is organized by # of users who have ”added” the book,  not # of users who have marked the book as ”read”</a:t>
             </a:r>
           </a:p>
           <a:p>
             <a:r>
-              <a:rPr lang="en-US" dirty="0"/>
+              <a:rPr lang="en-US" sz="2800" dirty="0"/>
               <a:t>Readers classify genre, not Goodreads.</a:t>
             </a:r>
           </a:p>
@@ -4674,7 +4765,7 @@
           <a:p>
             <a:r>
               <a:rPr lang="en-US" dirty="0"/>
-              <a:t>What affects rating?</a:t>
+              <a:t>Ratings by genre</a:t>
             </a:r>
           </a:p>
         </p:txBody>
@@ -4761,7 +4852,7 @@
           <a:p>
             <a:r>
               <a:rPr lang="en-US" dirty="0"/>
-              <a:t>What affects rating?</a:t>
+              <a:t>Ratings by number of awards</a:t>
             </a:r>
           </a:p>
         </p:txBody>
@@ -5103,7 +5194,7 @@
           <a:p>
             <a:r>
               <a:rPr lang="en-US" dirty="0"/>
-              <a:t>What affects rating?</a:t>
+              <a:t>Total readers by number of awards</a:t>
             </a:r>
           </a:p>
         </p:txBody>

</xml_diff>